<commit_message>
Updated JDK build version
</commit_message>
<xml_diff>
--- a/LambdasNightHackingLabPresentation.pptx
+++ b/LambdasNightHackingLabPresentation.pptx
@@ -20786,12 +20786,17 @@
           <a:p>
             <a:r>
               <a:rPr lang="en-US" dirty="0"/>
-              <a:t>Install JDK8 Build </a:t>
-            </a:r>
-            <a:r>
-              <a:rPr lang="en-US" dirty="0" smtClean="0"/>
-              <a:t>121</a:t>
-            </a:r>
+              <a:t>Install JDK8 </a:t>
+            </a:r>
+            <a:r>
+              <a:rPr lang="en-US"/>
+              <a:t>Build </a:t>
+            </a:r>
+            <a:r>
+              <a:rPr lang="en-US" smtClean="0"/>
+              <a:t>123</a:t>
+            </a:r>
+            <a:endParaRPr lang="en-US" dirty="0" smtClean="0"/>
           </a:p>
           <a:p>
             <a:pPr lvl="1"/>

</xml_diff>